<commit_message>
uploading fixes to linear regression code & slides
</commit_message>
<xml_diff>
--- a/slides/06_linear_regression.pptx
+++ b/slides/06_linear_regression.pptx
@@ -271,7 +271,7 @@
           <a:p>
             <a:fld id="{DB92F479-4B50-F243-9713-1B12EC2B4BDB}" type="datetimeFigureOut">
               <a:rPr lang="en-US" smtClean="0"/>
-              <a:t>2/1/15</a:t>
+              <a:t>2/5/15</a:t>
             </a:fld>
             <a:endParaRPr lang="en-US"/>
           </a:p>
@@ -14323,22 +14323,14 @@
             </a:br>
             <a:r>
               <a:rPr lang="en-US" sz="9000" dirty="0" smtClean="0"/>
-              <a:t>DATA </a:t>
-            </a:r>
-            <a:r>
-              <a:rPr lang="en-US" sz="9000" dirty="0" smtClean="0"/>
-              <a:t>SCIENCE</a:t>
+              <a:t>DATA SCIENCE</a:t>
             </a:r>
             <a:br>
               <a:rPr lang="en-US" sz="9000" dirty="0" smtClean="0"/>
             </a:br>
             <a:r>
               <a:rPr lang="en-US" sz="6000" dirty="0" smtClean="0"/>
-              <a:t>Class </a:t>
-            </a:r>
-            <a:r>
-              <a:rPr lang="en-US" sz="6000" dirty="0" smtClean="0"/>
-              <a:t>6: Linear regression</a:t>
+              <a:t>Class 6: Linear regression</a:t>
             </a:r>
             <a:endParaRPr lang="en-US" sz="6000" dirty="0"/>
           </a:p>
@@ -15764,7 +15756,7 @@
           <a:graphicData uri="http://schemas.openxmlformats.org/presentationml/2006/ole">
             <mc:AlternateContent xmlns:mc="http://schemas.openxmlformats.org/markup-compatibility/2006">
               <mc:Choice xmlns:v="urn:schemas-microsoft-com:vml" Requires="v">
-                <p:oleObj spid="_x0000_s41054" name="Equation" r:id="rId4" imgW="1549080" imgH="330120" progId="Equation.3">
+                <p:oleObj spid="_x0000_s41058" name="Equation" r:id="rId4" imgW="1549080" imgH="330120" progId="Equation.3">
                   <p:embed/>
                 </p:oleObj>
               </mc:Choice>
@@ -16146,7 +16138,7 @@
           <a:graphicData uri="http://schemas.openxmlformats.org/presentationml/2006/ole">
             <mc:AlternateContent xmlns:mc="http://schemas.openxmlformats.org/markup-compatibility/2006">
               <mc:Choice xmlns:v="urn:schemas-microsoft-com:vml" Requires="v">
-                <p:oleObj spid="_x0000_s18736" name="Equation" r:id="rId4" imgW="1155600" imgH="241200" progId="Equation.3">
+                <p:oleObj spid="_x0000_s18746" name="Equation" r:id="rId4" imgW="1155600" imgH="241200" progId="Equation.3">
                   <p:embed/>
                 </p:oleObj>
               </mc:Choice>
@@ -16278,7 +16270,7 @@
           <a:graphicData uri="http://schemas.openxmlformats.org/presentationml/2006/ole">
             <mc:AlternateContent xmlns:mc="http://schemas.openxmlformats.org/markup-compatibility/2006">
               <mc:Choice xmlns:v="urn:schemas-microsoft-com:vml" Requires="v">
-                <p:oleObj spid="_x0000_s18737" name="Equation" r:id="rId6" imgW="1041120" imgH="1143000" progId="Equation.3">
+                <p:oleObj spid="_x0000_s18747" name="Equation" r:id="rId6" imgW="1041120" imgH="1143000" progId="Equation.3">
                   <p:embed/>
                 </p:oleObj>
               </mc:Choice>
@@ -16342,7 +16334,7 @@
           <a:graphicData uri="http://schemas.openxmlformats.org/presentationml/2006/ole">
             <mc:AlternateContent xmlns:mc="http://schemas.openxmlformats.org/markup-compatibility/2006">
               <mc:Choice xmlns:v="urn:schemas-microsoft-com:vml" Requires="v">
-                <p:oleObj spid="_x0000_s18738" name="Equation" r:id="rId8" imgW="761760" imgH="1143000" progId="Equation.3">
+                <p:oleObj spid="_x0000_s18748" name="Equation" r:id="rId8" imgW="761760" imgH="1143000" progId="Equation.3">
                   <p:embed/>
                 </p:oleObj>
               </mc:Choice>
@@ -16763,7 +16755,7 @@
           <a:graphicData uri="http://schemas.openxmlformats.org/presentationml/2006/ole">
             <mc:AlternateContent xmlns:mc="http://schemas.openxmlformats.org/markup-compatibility/2006">
               <mc:Choice xmlns:v="urn:schemas-microsoft-com:vml" Requires="v">
-                <p:oleObj spid="_x0000_s22003" name="Equation" r:id="rId4" imgW="1155600" imgH="241200" progId="Equation.3">
+                <p:oleObj spid="_x0000_s22016" name="Equation" r:id="rId4" imgW="1155600" imgH="241200" progId="Equation.3">
                   <p:embed/>
                 </p:oleObj>
               </mc:Choice>
@@ -16949,7 +16941,7 @@
           <a:graphicData uri="http://schemas.openxmlformats.org/presentationml/2006/ole">
             <mc:AlternateContent xmlns:mc="http://schemas.openxmlformats.org/markup-compatibility/2006">
               <mc:Choice xmlns:v="urn:schemas-microsoft-com:vml" Requires="v">
-                <p:oleObj spid="_x0000_s22004" name="Equation" r:id="rId6" imgW="1041120" imgH="1143000" progId="Equation.3">
+                <p:oleObj spid="_x0000_s22017" name="Equation" r:id="rId6" imgW="1041120" imgH="1143000" progId="Equation.3">
                   <p:embed/>
                 </p:oleObj>
               </mc:Choice>
@@ -17013,7 +17005,7 @@
           <a:graphicData uri="http://schemas.openxmlformats.org/presentationml/2006/ole">
             <mc:AlternateContent xmlns:mc="http://schemas.openxmlformats.org/markup-compatibility/2006">
               <mc:Choice xmlns:v="urn:schemas-microsoft-com:vml" Requires="v">
-                <p:oleObj spid="_x0000_s22005" name="Equation" r:id="rId8" imgW="761760" imgH="1143000" progId="Equation.3">
+                <p:oleObj spid="_x0000_s22018" name="Equation" r:id="rId8" imgW="761760" imgH="1143000" progId="Equation.3">
                   <p:embed/>
                 </p:oleObj>
               </mc:Choice>
@@ -17077,7 +17069,7 @@
           <a:graphicData uri="http://schemas.openxmlformats.org/presentationml/2006/ole">
             <mc:AlternateContent xmlns:mc="http://schemas.openxmlformats.org/markup-compatibility/2006">
               <mc:Choice xmlns:v="urn:schemas-microsoft-com:vml" Requires="v">
-                <p:oleObj spid="_x0000_s22006" name="Equation" r:id="rId10" imgW="4851360" imgH="1143000" progId="Equation.3">
+                <p:oleObj spid="_x0000_s22019" name="Equation" r:id="rId10" imgW="4851360" imgH="1143000" progId="Equation.3">
                   <p:embed/>
                 </p:oleObj>
               </mc:Choice>
@@ -17698,7 +17690,7 @@
           <a:graphicData uri="http://schemas.openxmlformats.org/presentationml/2006/ole">
             <mc:AlternateContent xmlns:mc="http://schemas.openxmlformats.org/markup-compatibility/2006">
               <mc:Choice xmlns:v="urn:schemas-microsoft-com:vml" Requires="v">
-                <p:oleObj spid="_x0000_s23145" name="Equation" r:id="rId4" imgW="4013200" imgH="546100" progId="Equation.3">
+                <p:oleObj spid="_x0000_s23155" name="Equation" r:id="rId4" imgW="4013200" imgH="546100" progId="Equation.3">
                   <p:embed/>
                 </p:oleObj>
               </mc:Choice>
@@ -17762,7 +17754,7 @@
           <a:graphicData uri="http://schemas.openxmlformats.org/presentationml/2006/ole">
             <mc:AlternateContent xmlns:mc="http://schemas.openxmlformats.org/markup-compatibility/2006">
               <mc:Choice xmlns:v="urn:schemas-microsoft-com:vml" Requires="v">
-                <p:oleObj spid="_x0000_s23146" name="Equation" r:id="rId6" imgW="1155600" imgH="241200" progId="Equation.3">
+                <p:oleObj spid="_x0000_s23156" name="Equation" r:id="rId6" imgW="1155600" imgH="241200" progId="Equation.3">
                   <p:embed/>
                 </p:oleObj>
               </mc:Choice>
@@ -18056,7 +18048,7 @@
           <a:graphicData uri="http://schemas.openxmlformats.org/presentationml/2006/ole">
             <mc:AlternateContent xmlns:mc="http://schemas.openxmlformats.org/markup-compatibility/2006">
               <mc:Choice xmlns:v="urn:schemas-microsoft-com:vml" Requires="v">
-                <p:oleObj spid="_x0000_s23147" name="Equation" r:id="rId8" imgW="1981080" imgH="393480" progId="Equation.3">
+                <p:oleObj spid="_x0000_s23157" name="Equation" r:id="rId8" imgW="1981080" imgH="393480" progId="Equation.3">
                   <p:embed/>
                 </p:oleObj>
               </mc:Choice>
@@ -18313,7 +18305,7 @@
           <a:graphicData uri="http://schemas.openxmlformats.org/presentationml/2006/ole">
             <mc:AlternateContent xmlns:mc="http://schemas.openxmlformats.org/markup-compatibility/2006">
               <mc:Choice xmlns:v="urn:schemas-microsoft-com:vml" Requires="v">
-                <p:oleObj spid="_x0000_s25081" name="Equation" r:id="rId4" imgW="3949560" imgH="1143000" progId="Equation.3">
+                <p:oleObj spid="_x0000_s25094" name="Equation" r:id="rId4" imgW="3949560" imgH="1143000" progId="Equation.3">
                   <p:embed/>
                 </p:oleObj>
               </mc:Choice>
@@ -18377,7 +18369,7 @@
           <a:graphicData uri="http://schemas.openxmlformats.org/presentationml/2006/ole">
             <mc:AlternateContent xmlns:mc="http://schemas.openxmlformats.org/markup-compatibility/2006">
               <mc:Choice xmlns:v="urn:schemas-microsoft-com:vml" Requires="v">
-                <p:oleObj spid="_x0000_s25082" name="Equation" r:id="rId6" imgW="1155600" imgH="241200" progId="Equation.3">
+                <p:oleObj spid="_x0000_s25095" name="Equation" r:id="rId6" imgW="1155600" imgH="241200" progId="Equation.3">
                   <p:embed/>
                 </p:oleObj>
               </mc:Choice>
@@ -18512,7 +18504,7 @@
           <a:graphicData uri="http://schemas.openxmlformats.org/presentationml/2006/ole">
             <mc:AlternateContent xmlns:mc="http://schemas.openxmlformats.org/markup-compatibility/2006">
               <mc:Choice xmlns:v="urn:schemas-microsoft-com:vml" Requires="v">
-                <p:oleObj spid="_x0000_s25083" name="Equation" r:id="rId8" imgW="1041120" imgH="1143000" progId="Equation.3">
+                <p:oleObj spid="_x0000_s25096" name="Equation" r:id="rId8" imgW="1041120" imgH="1143000" progId="Equation.3">
                   <p:embed/>
                 </p:oleObj>
               </mc:Choice>
@@ -18576,7 +18568,7 @@
           <a:graphicData uri="http://schemas.openxmlformats.org/presentationml/2006/ole">
             <mc:AlternateContent xmlns:mc="http://schemas.openxmlformats.org/markup-compatibility/2006">
               <mc:Choice xmlns:v="urn:schemas-microsoft-com:vml" Requires="v">
-                <p:oleObj spid="_x0000_s25084" name="Equation" r:id="rId10" imgW="761760" imgH="1143000" progId="Equation.3">
+                <p:oleObj spid="_x0000_s25097" name="Equation" r:id="rId10" imgW="761760" imgH="1143000" progId="Equation.3">
                   <p:embed/>
                 </p:oleObj>
               </mc:Choice>
@@ -18741,7 +18733,7 @@
           <a:graphicData uri="http://schemas.openxmlformats.org/presentationml/2006/ole">
             <mc:AlternateContent xmlns:mc="http://schemas.openxmlformats.org/markup-compatibility/2006">
               <mc:Choice xmlns:v="urn:schemas-microsoft-com:vml" Requires="v">
-                <p:oleObj spid="_x0000_s28034" name="Equation" r:id="rId4" imgW="1155600" imgH="241200" progId="Equation.3">
+                <p:oleObj spid="_x0000_s28041" name="Equation" r:id="rId4" imgW="1155600" imgH="241200" progId="Equation.3">
                   <p:embed/>
                 </p:oleObj>
               </mc:Choice>
@@ -18824,7 +18816,7 @@
           <a:graphicData uri="http://schemas.openxmlformats.org/presentationml/2006/ole">
             <mc:AlternateContent xmlns:mc="http://schemas.openxmlformats.org/markup-compatibility/2006">
               <mc:Choice xmlns:v="urn:schemas-microsoft-com:vml" Requires="v">
-                <p:oleObj spid="_x0000_s28035" name="Equation" r:id="rId6" imgW="3429000" imgH="507960" progId="Equation.3">
+                <p:oleObj spid="_x0000_s28042" name="Equation" r:id="rId6" imgW="3429000" imgH="507960" progId="Equation.3">
                   <p:embed/>
                 </p:oleObj>
               </mc:Choice>
@@ -18975,15 +18967,7 @@
             </a:pPr>
             <a:r>
               <a:rPr lang="en-US" sz="6600" dirty="0" smtClean="0"/>
-              <a:t>III</a:t>
-            </a:r>
-            <a:r>
-              <a:rPr lang="en-US" sz="6600" dirty="0" smtClean="0"/>
-              <a:t>. </a:t>
-            </a:r>
-            <a:r>
-              <a:rPr lang="en-US" sz="6600" dirty="0" smtClean="0"/>
-              <a:t>Determining overall model relevance</a:t>
+              <a:t>III. Determining overall model relevance</a:t>
             </a:r>
             <a:endParaRPr lang="en-US" sz="6600" dirty="0"/>
           </a:p>
@@ -19516,7 +19500,6 @@
               <a:rPr lang="en-US" dirty="0" smtClean="0"/>
               <a:t>Overall model relevance</a:t>
             </a:r>
-            <a:endParaRPr lang="en-US" dirty="0" smtClean="0"/>
           </a:p>
         </p:txBody>
       </p:sp>
@@ -19971,7 +19954,6 @@
               <a:rPr lang="en-US" dirty="0" smtClean="0"/>
               <a:t>Overall model relevance</a:t>
             </a:r>
-            <a:endParaRPr lang="en-US" dirty="0" smtClean="0"/>
           </a:p>
         </p:txBody>
       </p:sp>
@@ -20577,15 +20559,7 @@
                 <a:ea typeface="ヒラギノ角ゴ ProN W6" charset="0"/>
                 <a:cs typeface="ヒラギノ角ゴ ProN W6" charset="0"/>
               </a:rPr>
-              <a:t>I.   </a:t>
-            </a:r>
-            <a:r>
-              <a:rPr lang="en-US" sz="3000" dirty="0" smtClean="0">
-                <a:latin typeface="PFDinTextCompPro-Bold" charset="0"/>
-                <a:ea typeface="ヒラギノ角ゴ ProN W6" charset="0"/>
-                <a:cs typeface="ヒラギノ角ゴ ProN W6" charset="0"/>
-              </a:rPr>
-              <a:t>	BASIC FORM</a:t>
+              <a:t>I.   	BASIC FORM</a:t>
             </a:r>
             <a:br>
               <a:rPr lang="en-US" sz="3000" dirty="0" smtClean="0">
@@ -20600,38 +20574,49 @@
                 <a:ea typeface="ヒラギノ角ゴ ProN W6" charset="0"/>
                 <a:cs typeface="ヒラギノ角ゴ ProN W6" charset="0"/>
               </a:rPr>
-              <a:t>II.   </a:t>
-            </a:r>
+              <a:t>II.   	</a:t>
+            </a:r>
+            <a:r>
+              <a:rPr lang="en-US" sz="3200" dirty="0"/>
+              <a:t>ESTIMATING </a:t>
+            </a:r>
+            <a:r>
+              <a:rPr lang="en-US" sz="3200" dirty="0" smtClean="0"/>
+              <a:t>COEFFICIENTS</a:t>
+            </a:r>
+            <a:br>
+              <a:rPr lang="en-US" sz="3200" dirty="0" smtClean="0"/>
+            </a:br>
+            <a:r>
+              <a:rPr lang="en-US" sz="3200" dirty="0" smtClean="0"/>
+              <a:t>iii. 	Determining </a:t>
+            </a:r>
+            <a:r>
+              <a:rPr lang="en-US" sz="3200" dirty="0"/>
+              <a:t>overall model relevance</a:t>
+            </a:r>
+            <a:r>
+              <a:rPr lang="en-US" sz="3200" dirty="0" smtClean="0"/>
+              <a:t/>
+            </a:r>
+            <a:br>
+              <a:rPr lang="en-US" sz="3200" dirty="0" smtClean="0"/>
+            </a:br>
             <a:r>
               <a:rPr lang="en-US" sz="3000" dirty="0" smtClean="0">
                 <a:latin typeface="PFDinTextCompPro-Bold" charset="0"/>
                 <a:ea typeface="ヒラギノ角ゴ ProN W6" charset="0"/>
                 <a:cs typeface="ヒラギノ角ゴ ProN W6" charset="0"/>
               </a:rPr>
-              <a:t>	</a:t>
+              <a:t>Iv. 	</a:t>
             </a:r>
             <a:r>
               <a:rPr lang="en-US" sz="3200" dirty="0"/>
-              <a:t>ESTIMATING </a:t>
+              <a:t>Understanding model </a:t>
             </a:r>
             <a:r>
               <a:rPr lang="en-US" sz="3200" dirty="0" smtClean="0"/>
-              <a:t>COEFFICIENTS</a:t>
-            </a:r>
-            <a:br>
-              <a:rPr lang="en-US" sz="3200" dirty="0" smtClean="0"/>
-            </a:br>
-            <a:r>
-              <a:rPr lang="en-US" sz="3200" dirty="0" smtClean="0"/>
-              <a:t>iii. 	Determining </a:t>
-            </a:r>
-            <a:r>
-              <a:rPr lang="en-US" sz="3200" dirty="0"/>
-              <a:t>overall model relevance</a:t>
-            </a:r>
-            <a:r>
-              <a:rPr lang="en-US" sz="3200" dirty="0" smtClean="0"/>
-              <a:t/>
+              <a:t>coefficients</a:t>
             </a:r>
             <a:br>
               <a:rPr lang="en-US" sz="3200" dirty="0" smtClean="0"/>
@@ -20642,65 +20627,22 @@
                 <a:ea typeface="ヒラギノ角ゴ ProN W6" charset="0"/>
                 <a:cs typeface="ヒラギノ角ゴ ProN W6" charset="0"/>
               </a:rPr>
-              <a:t>Iv. </a:t>
-            </a:r>
+              <a:t>V.  	</a:t>
+            </a:r>
+            <a:r>
+              <a:rPr lang="en-US" sz="3200" dirty="0" smtClean="0"/>
+              <a:t>GOTCHAS</a:t>
+            </a:r>
+            <a:br>
+              <a:rPr lang="en-US" sz="3200" dirty="0" smtClean="0"/>
+            </a:br>
             <a:r>
               <a:rPr lang="en-US" sz="3000" dirty="0" smtClean="0">
                 <a:latin typeface="PFDinTextCompPro-Bold" charset="0"/>
                 <a:ea typeface="ヒラギノ角ゴ ProN W6" charset="0"/>
                 <a:cs typeface="ヒラギノ角ゴ ProN W6" charset="0"/>
               </a:rPr>
-              <a:t>	</a:t>
-            </a:r>
-            <a:r>
-              <a:rPr lang="en-US" sz="3200" dirty="0"/>
-              <a:t>Understanding model </a:t>
-            </a:r>
-            <a:r>
-              <a:rPr lang="en-US" sz="3200" dirty="0" smtClean="0"/>
-              <a:t>coefficients</a:t>
-            </a:r>
-            <a:br>
-              <a:rPr lang="en-US" sz="3200" dirty="0" smtClean="0"/>
-            </a:br>
-            <a:r>
-              <a:rPr lang="en-US" sz="3000" dirty="0" smtClean="0">
-                <a:latin typeface="PFDinTextCompPro-Bold" charset="0"/>
-                <a:ea typeface="ヒラギノ角ゴ ProN W6" charset="0"/>
-                <a:cs typeface="ヒラギノ角ゴ ProN W6" charset="0"/>
-              </a:rPr>
-              <a:t>V.  </a:t>
-            </a:r>
-            <a:r>
-              <a:rPr lang="en-US" sz="3000" dirty="0" smtClean="0">
-                <a:latin typeface="PFDinTextCompPro-Bold" charset="0"/>
-                <a:ea typeface="ヒラギノ角ゴ ProN W6" charset="0"/>
-                <a:cs typeface="ヒラギノ角ゴ ProN W6" charset="0"/>
-              </a:rPr>
-              <a:t>	</a:t>
-            </a:r>
-            <a:r>
-              <a:rPr lang="en-US" sz="3200" dirty="0" smtClean="0"/>
-              <a:t>GOTCHAS</a:t>
-            </a:r>
-            <a:br>
-              <a:rPr lang="en-US" sz="3200" dirty="0" smtClean="0"/>
-            </a:br>
-            <a:r>
-              <a:rPr lang="en-US" sz="3000" dirty="0" smtClean="0">
-                <a:latin typeface="PFDinTextCompPro-Bold" charset="0"/>
-                <a:ea typeface="ヒラギノ角ゴ ProN W6" charset="0"/>
-                <a:cs typeface="ヒラギノ角ゴ ProN W6" charset="0"/>
-              </a:rPr>
-              <a:t>Vi. </a:t>
-            </a:r>
-            <a:r>
-              <a:rPr lang="en-US" sz="3000" dirty="0" smtClean="0">
-                <a:latin typeface="PFDinTextCompPro-Bold" charset="0"/>
-                <a:ea typeface="ヒラギノ角ゴ ProN W6" charset="0"/>
-                <a:cs typeface="ヒラギノ角ゴ ProN W6" charset="0"/>
-              </a:rPr>
-              <a:t>	CATEGORICAL VARIABLES</a:t>
+              <a:t>Vi. 	CATEGORICAL VARIABLES</a:t>
             </a:r>
             <a:endParaRPr lang="en-US" sz="3000" cap="none" dirty="0">
               <a:latin typeface="PFDinTextCompPro-Bold" charset="0"/>
@@ -20855,7 +20797,6 @@
               <a:rPr lang="en-US" dirty="0" smtClean="0"/>
               <a:t>Overall model relevance</a:t>
             </a:r>
-            <a:endParaRPr lang="en-US" dirty="0" smtClean="0"/>
           </a:p>
         </p:txBody>
       </p:sp>
@@ -23575,7 +23516,7 @@
           <a:graphicData uri="http://schemas.openxmlformats.org/presentationml/2006/ole">
             <mc:AlternateContent xmlns:mc="http://schemas.openxmlformats.org/markup-compatibility/2006">
               <mc:Choice xmlns:v="urn:schemas-microsoft-com:vml" Requires="v">
-                <p:oleObj spid="_x0000_s56391" name="Equation" r:id="rId4" imgW="2158920" imgH="419040" progId="Equation.3">
+                <p:oleObj spid="_x0000_s56398" name="Equation" r:id="rId4" imgW="2158920" imgH="419040" progId="Equation.3">
                   <p:embed/>
                 </p:oleObj>
               </mc:Choice>
@@ -23658,7 +23599,7 @@
           <a:graphicData uri="http://schemas.openxmlformats.org/presentationml/2006/ole">
             <mc:AlternateContent xmlns:mc="http://schemas.openxmlformats.org/markup-compatibility/2006">
               <mc:Choice xmlns:v="urn:schemas-microsoft-com:vml" Requires="v">
-                <p:oleObj spid="_x0000_s56392" name="Equation" r:id="rId6" imgW="2158920" imgH="342720" progId="Equation.3">
+                <p:oleObj spid="_x0000_s56399" name="Equation" r:id="rId6" imgW="2158920" imgH="342720" progId="Equation.3">
                   <p:embed/>
                 </p:oleObj>
               </mc:Choice>
@@ -24352,7 +24293,6 @@
               <a:rPr lang="en-US" dirty="0" smtClean="0"/>
               <a:t>Understanding model coefficients</a:t>
             </a:r>
-            <a:endParaRPr lang="en-US" dirty="0" smtClean="0"/>
           </a:p>
         </p:txBody>
       </p:sp>
@@ -25510,7 +25450,7 @@
         <p:spPr>
           <a:xfrm>
             <a:off x="490537" y="1028700"/>
-            <a:ext cx="4648200" cy="3139321"/>
+            <a:ext cx="4648200" cy="2862323"/>
           </a:xfrm>
           <a:prstGeom prst="rect">
             <a:avLst/>
@@ -25601,11 +25541,25 @@
               <a:buChar char="•"/>
             </a:pPr>
             <a:r>
+              <a:rPr lang="en-US" sz="1800" smtClean="0">
+                <a:latin typeface="PFDinTextCompPro-Italic"/>
+                <a:cs typeface="PFDinTextCompPro-Italic"/>
+              </a:rPr>
+              <a:t>If zero </a:t>
+            </a:r>
+            <a:r>
               <a:rPr lang="en-US" sz="1800" dirty="0" smtClean="0">
                 <a:latin typeface="PFDinTextCompPro-Italic"/>
                 <a:cs typeface="PFDinTextCompPro-Italic"/>
               </a:rPr>
-              <a:t>In al cases, the p-value is greater than 0.05 when 0 falls within the 95% confidence interval of the regression coefficient.</a:t>
+              <a:t>falls within the 95% confidence interval of the regression </a:t>
+            </a:r>
+            <a:r>
+              <a:rPr lang="en-US" sz="1800" dirty="0" smtClean="0">
+                <a:latin typeface="PFDinTextCompPro-Italic"/>
+                <a:cs typeface="PFDinTextCompPro-Italic"/>
+              </a:rPr>
+              <a:t>coefficient, the p-value will be greater than 0.05.</a:t>
             </a:r>
             <a:endParaRPr lang="en-US" sz="1800" dirty="0">
               <a:latin typeface="PFDinTextCompPro-Italic"/>
@@ -26974,7 +26928,7 @@
           <a:graphicData uri="http://schemas.openxmlformats.org/presentationml/2006/ole">
             <mc:AlternateContent xmlns:mc="http://schemas.openxmlformats.org/markup-compatibility/2006">
               <mc:Choice xmlns:v="urn:schemas-microsoft-com:vml" Requires="v">
-                <p:oleObj spid="_x0000_s36090" name="Equation" r:id="rId4" imgW="190440" imgH="266400" progId="Equation.3">
+                <p:oleObj spid="_x0000_s36097" name="Equation" r:id="rId4" imgW="190440" imgH="266400" progId="Equation.3">
                   <p:embed/>
                 </p:oleObj>
               </mc:Choice>
@@ -27057,7 +27011,7 @@
           <a:graphicData uri="http://schemas.openxmlformats.org/presentationml/2006/ole">
             <mc:AlternateContent xmlns:mc="http://schemas.openxmlformats.org/markup-compatibility/2006">
               <mc:Choice xmlns:v="urn:schemas-microsoft-com:vml" Requires="v">
-                <p:oleObj spid="_x0000_s36091" name="Equation" r:id="rId6" imgW="177480" imgH="215640" progId="Equation.3">
+                <p:oleObj spid="_x0000_s36098" name="Equation" r:id="rId6" imgW="177480" imgH="215640" progId="Equation.3">
                   <p:embed/>
                 </p:oleObj>
               </mc:Choice>
@@ -28638,7 +28592,7 @@
           <a:graphicData uri="http://schemas.openxmlformats.org/presentationml/2006/ole">
             <mc:AlternateContent xmlns:mc="http://schemas.openxmlformats.org/markup-compatibility/2006">
               <mc:Choice xmlns:v="urn:schemas-microsoft-com:vml" Requires="v">
-                <p:oleObj spid="_x0000_s60448" name="Equation" r:id="rId4" imgW="863280" imgH="444240" progId="Equation.3">
+                <p:oleObj spid="_x0000_s60452" name="Equation" r:id="rId4" imgW="863280" imgH="444240" progId="Equation.3">
                   <p:embed/>
                 </p:oleObj>
               </mc:Choice>
@@ -29252,7 +29206,7 @@
           <a:graphicData uri="http://schemas.openxmlformats.org/presentationml/2006/ole">
             <mc:AlternateContent xmlns:mc="http://schemas.openxmlformats.org/markup-compatibility/2006">
               <mc:Choice xmlns:v="urn:schemas-microsoft-com:vml" Requires="v">
-                <p:oleObj spid="_x0000_s10491" name="Equation" r:id="rId4" imgW="2755800" imgH="596880" progId="Equation.3">
+                <p:oleObj spid="_x0000_s10495" name="Equation" r:id="rId4" imgW="2755800" imgH="596880" progId="Equation.3">
                   <p:embed/>
                 </p:oleObj>
               </mc:Choice>
@@ -29874,11 +29828,7 @@
             </a:r>
             <a:r>
               <a:rPr lang="en-US" sz="6600" dirty="0" smtClean="0"/>
-              <a:t>. </a:t>
-            </a:r>
-            <a:r>
-              <a:rPr lang="en-US" sz="6600" dirty="0" smtClean="0"/>
-              <a:t>Basic Form</a:t>
+              <a:t>. Basic Form</a:t>
             </a:r>
             <a:endParaRPr lang="en-US" sz="6600" dirty="0"/>
           </a:p>
@@ -30239,7 +30189,7 @@
           <a:graphicData uri="http://schemas.openxmlformats.org/presentationml/2006/ole">
             <mc:AlternateContent xmlns:mc="http://schemas.openxmlformats.org/markup-compatibility/2006">
               <mc:Choice xmlns:v="urn:schemas-microsoft-com:vml" Requires="v">
-                <p:oleObj spid="_x0000_s11984" name="Equation" r:id="rId7" imgW="139680" imgH="203040" progId="Equation.3">
+                <p:oleObj spid="_x0000_s11994" name="Equation" r:id="rId7" imgW="139680" imgH="203040" progId="Equation.3">
                   <p:embed/>
                 </p:oleObj>
               </mc:Choice>
@@ -30322,7 +30272,7 @@
           <a:graphicData uri="http://schemas.openxmlformats.org/presentationml/2006/ole">
             <mc:AlternateContent xmlns:mc="http://schemas.openxmlformats.org/markup-compatibility/2006">
               <mc:Choice xmlns:v="urn:schemas-microsoft-com:vml" Requires="v">
-                <p:oleObj spid="_x0000_s11985" name="Equation" r:id="rId9" imgW="139680" imgH="203040" progId="Equation.3">
+                <p:oleObj spid="_x0000_s11995" name="Equation" r:id="rId9" imgW="139680" imgH="203040" progId="Equation.3">
                   <p:embed/>
                 </p:oleObj>
               </mc:Choice>
@@ -30405,7 +30355,7 @@
           <a:graphicData uri="http://schemas.openxmlformats.org/presentationml/2006/ole">
             <mc:AlternateContent xmlns:mc="http://schemas.openxmlformats.org/markup-compatibility/2006">
               <mc:Choice xmlns:v="urn:schemas-microsoft-com:vml" Requires="v">
-                <p:oleObj spid="_x0000_s11986" name="Equation" r:id="rId10" imgW="139680" imgH="203040" progId="Equation.3">
+                <p:oleObj spid="_x0000_s11996" name="Equation" r:id="rId10" imgW="139680" imgH="203040" progId="Equation.3">
                   <p:embed/>
                 </p:oleObj>
               </mc:Choice>
@@ -31160,7 +31110,7 @@
           <a:graphicData uri="http://schemas.openxmlformats.org/presentationml/2006/ole">
             <mc:AlternateContent xmlns:mc="http://schemas.openxmlformats.org/markup-compatibility/2006">
               <mc:Choice xmlns:v="urn:schemas-microsoft-com:vml" Requires="v">
-                <p:oleObj spid="_x0000_s31224" name="Equation" r:id="rId7" imgW="139680" imgH="203040" progId="Equation.3">
+                <p:oleObj spid="_x0000_s31234" name="Equation" r:id="rId7" imgW="139680" imgH="203040" progId="Equation.3">
                   <p:embed/>
                 </p:oleObj>
               </mc:Choice>
@@ -31243,7 +31193,7 @@
           <a:graphicData uri="http://schemas.openxmlformats.org/presentationml/2006/ole">
             <mc:AlternateContent xmlns:mc="http://schemas.openxmlformats.org/markup-compatibility/2006">
               <mc:Choice xmlns:v="urn:schemas-microsoft-com:vml" Requires="v">
-                <p:oleObj spid="_x0000_s31225" name="Equation" r:id="rId9" imgW="139680" imgH="203040" progId="Equation.3">
+                <p:oleObj spid="_x0000_s31235" name="Equation" r:id="rId9" imgW="139680" imgH="203040" progId="Equation.3">
                   <p:embed/>
                 </p:oleObj>
               </mc:Choice>
@@ -31326,7 +31276,7 @@
           <a:graphicData uri="http://schemas.openxmlformats.org/presentationml/2006/ole">
             <mc:AlternateContent xmlns:mc="http://schemas.openxmlformats.org/markup-compatibility/2006">
               <mc:Choice xmlns:v="urn:schemas-microsoft-com:vml" Requires="v">
-                <p:oleObj spid="_x0000_s31226" name="Equation" r:id="rId10" imgW="139680" imgH="203040" progId="Equation.3">
+                <p:oleObj spid="_x0000_s31236" name="Equation" r:id="rId10" imgW="139680" imgH="203040" progId="Equation.3">
                   <p:embed/>
                 </p:oleObj>
               </mc:Choice>
@@ -32876,15 +32826,7 @@
             </a:pPr>
             <a:r>
               <a:rPr lang="en-US" sz="6600" dirty="0" smtClean="0"/>
-              <a:t>Vi. </a:t>
-            </a:r>
-            <a:r>
-              <a:rPr lang="en-US" sz="6600" dirty="0" smtClean="0"/>
-              <a:t>CATEGORICAL </a:t>
-            </a:r>
-            <a:r>
-              <a:rPr lang="en-US" sz="6600" dirty="0" smtClean="0"/>
-              <a:t>Features</a:t>
+              <a:t>Vi. CATEGORICAL Features</a:t>
             </a:r>
             <a:endParaRPr lang="en-US" sz="6600" dirty="0"/>
           </a:p>
@@ -35380,23 +35322,7 @@
                 <a:ea typeface="ヒラギノ角ゴ ProN W3" charset="0"/>
                 <a:cs typeface="ヒラギノ角ゴ ProN W3" charset="0"/>
               </a:rPr>
-              <a:t>L</a:t>
-            </a:r>
-            <a:r>
-              <a:rPr lang="en-US" cap="none" dirty="0" smtClean="0">
-                <a:latin typeface="PFDinTextCompPro-Bold" charset="0"/>
-                <a:ea typeface="ヒラギノ角ゴ ProN W3" charset="0"/>
-                <a:cs typeface="ヒラギノ角ゴ ProN W3" charset="0"/>
-              </a:rPr>
-              <a:t>INEAR </a:t>
-            </a:r>
-            <a:r>
-              <a:rPr lang="en-US" cap="none" dirty="0" smtClean="0">
-                <a:latin typeface="PFDinTextCompPro-Bold" charset="0"/>
-                <a:ea typeface="ヒラギノ角ゴ ProN W3" charset="0"/>
-                <a:cs typeface="ヒラギノ角ゴ ProN W3" charset="0"/>
-              </a:rPr>
-              <a:t>REGRESSION</a:t>
+              <a:t>LINEAR REGRESSION</a:t>
             </a:r>
             <a:endParaRPr lang="en-US" cap="none" dirty="0">
               <a:latin typeface="PFDinTextCompPro-Bold" charset="0"/>
@@ -36028,7 +35954,6 @@
               <a:rPr lang="en-US" dirty="0" smtClean="0"/>
               <a:t>HOW DO WE INTEPRET THE MODEL?</a:t>
             </a:r>
-            <a:endParaRPr lang="en-US" dirty="0" smtClean="0"/>
           </a:p>
         </p:txBody>
       </p:sp>
@@ -38713,49 +38638,7 @@
                 <a:latin typeface="Helvetica"/>
                 <a:cs typeface="Helvetica"/>
               </a:rPr>
-              <a:t>We can extend </a:t>
-            </a:r>
-            <a:r>
-              <a:rPr lang="en-US" sz="3000" dirty="0" smtClean="0">
-                <a:latin typeface="Helvetica"/>
-                <a:cs typeface="Helvetica"/>
-              </a:rPr>
-              <a:t>our model to </a:t>
-            </a:r>
-            <a:r>
-              <a:rPr lang="en-US" sz="3000" dirty="0" smtClean="0">
-                <a:latin typeface="Helvetica"/>
-                <a:cs typeface="Helvetica"/>
-              </a:rPr>
-              <a:t>several </a:t>
-            </a:r>
-            <a:r>
-              <a:rPr lang="en-US" sz="3000" dirty="0" smtClean="0">
-                <a:latin typeface="Helvetica"/>
-                <a:cs typeface="Helvetica"/>
-              </a:rPr>
-              <a:t>explanatory features, </a:t>
-            </a:r>
-            <a:r>
-              <a:rPr lang="en-US" sz="3000" dirty="0" smtClean="0">
-                <a:latin typeface="Helvetica"/>
-                <a:cs typeface="Helvetica"/>
-              </a:rPr>
-              <a:t>giving us </a:t>
-            </a:r>
-            <a:r>
-              <a:rPr lang="en-US" sz="3000" dirty="0" smtClean="0">
-                <a:latin typeface="Helvetica"/>
-                <a:cs typeface="Helvetica"/>
-              </a:rPr>
-              <a:t>a multiple </a:t>
-            </a:r>
-            <a:r>
-              <a:rPr lang="en-US" sz="3000" dirty="0" smtClean="0">
-                <a:latin typeface="Helvetica"/>
-                <a:cs typeface="Helvetica"/>
-              </a:rPr>
-              <a:t>linear regression model:</a:t>
+              <a:t>We can extend our model to several explanatory features, giving us a multiple linear regression model:</a:t>
             </a:r>
           </a:p>
           <a:p>
@@ -38958,7 +38841,6 @@
               <a:rPr lang="en-US" dirty="0" smtClean="0"/>
               <a:t>Why do we care about linear regression?</a:t>
             </a:r>
-            <a:endParaRPr lang="en-US" dirty="0" smtClean="0"/>
           </a:p>
         </p:txBody>
       </p:sp>
@@ -39488,11 +39370,7 @@
             </a:pPr>
             <a:r>
               <a:rPr lang="en-US" sz="6600" dirty="0" smtClean="0"/>
-              <a:t>II. </a:t>
-            </a:r>
-            <a:r>
-              <a:rPr lang="en-US" sz="6600" dirty="0" smtClean="0"/>
-              <a:t>ESTIMATING COEFFICIENTS</a:t>
+              <a:t>II. ESTIMATING COEFFICIENTS</a:t>
             </a:r>
             <a:endParaRPr lang="en-US" sz="6600" dirty="0"/>
           </a:p>
@@ -39661,7 +39539,7 @@
           <a:graphicData uri="http://schemas.openxmlformats.org/presentationml/2006/ole">
             <mc:AlternateContent xmlns:mc="http://schemas.openxmlformats.org/markup-compatibility/2006">
               <mc:Choice xmlns:v="urn:schemas-microsoft-com:vml" Requires="v">
-                <p:oleObj spid="_x0000_s28908" name="Equation" r:id="rId4" imgW="253800" imgH="241200" progId="Equation.3">
+                <p:oleObj spid="_x0000_s28915" name="Equation" r:id="rId4" imgW="253800" imgH="241200" progId="Equation.3">
                   <p:embed/>
                 </p:oleObj>
               </mc:Choice>
@@ -39899,7 +39777,7 @@
           <a:graphicData uri="http://schemas.openxmlformats.org/presentationml/2006/ole">
             <mc:AlternateContent xmlns:mc="http://schemas.openxmlformats.org/markup-compatibility/2006">
               <mc:Choice xmlns:v="urn:schemas-microsoft-com:vml" Requires="v">
-                <p:oleObj spid="_x0000_s28909" name="Equation" r:id="rId6" imgW="254000" imgH="330200" progId="Equation.3">
+                <p:oleObj spid="_x0000_s28916" name="Equation" r:id="rId6" imgW="254000" imgH="330200" progId="Equation.3">
                   <p:embed/>
                 </p:oleObj>
               </mc:Choice>

</xml_diff>